<commit_message>
:art: special achievements (images and scripts)
</commit_message>
<xml_diff>
--- a/Modules/Platform/Achievements/Badges/Digital Explorer Badges.pptx
+++ b/Modules/Platform/Achievements/Badges/Digital Explorer Badges.pptx
@@ -216,7 +216,7 @@
 <file path=ppt/revisionInfo.xml><?xml version="1.0" encoding="utf-8"?>
 <p1510:revInfo xmlns:a="http://schemas.openxmlformats.org/drawingml/2006/main" xmlns:r="http://schemas.openxmlformats.org/officeDocument/2006/relationships" xmlns:p1510="http://schemas.microsoft.com/office/powerpoint/2015/10/main">
   <p1510:revLst>
-    <p1510:client id="{0D06C720-9C57-4E1E-B275-78274B6009E5}" v="202" dt="2018-07-09T08:54:06.901"/>
+    <p1510:client id="{DE14563C-17CB-460C-9B9E-4A97DFD9A9B8}" v="3" dt="2018-10-05T13:15:29.814"/>
   </p1510:revLst>
 </p1510:revInfo>
 </file>
@@ -225,111 +225,28 @@
 <pc:chgInfo xmlns:a="http://schemas.openxmlformats.org/drawingml/2006/main" xmlns:r="http://schemas.openxmlformats.org/officeDocument/2006/relationships" xmlns:ac="http://schemas.microsoft.com/office/drawing/2013/main/command" xmlns:pc="http://schemas.microsoft.com/office/powerpoint/2013/main/command">
   <pc:docChgLst>
     <pc:chgData name="David Stevens" userId="b6815b1ecc207c78" providerId="LiveId" clId="{92F79DC4-295C-419E-998B-5F1C8597ADC1}"/>
-    <pc:docChg chg="custSel addSld modSld">
-      <pc:chgData name="David Stevens" userId="b6815b1ecc207c78" providerId="LiveId" clId="{92F79DC4-295C-419E-998B-5F1C8597ADC1}" dt="2018-05-22T14:59:55.546" v="60" actId="108"/>
+  </pc:docChgLst>
+  <pc:docChgLst>
+    <pc:chgData name="David Stevens" userId="73fe415a-d21a-4898-bfab-0e75d37181d7" providerId="ADAL" clId="{DE14563C-17CB-460C-9B9E-4A97DFD9A9B8}"/>
+    <pc:docChg chg="modSld">
+      <pc:chgData name="David Stevens" userId="73fe415a-d21a-4898-bfab-0e75d37181d7" providerId="ADAL" clId="{DE14563C-17CB-460C-9B9E-4A97DFD9A9B8}" dt="2018-10-05T13:15:29.814" v="2" actId="207"/>
       <pc:docMkLst>
         <pc:docMk/>
       </pc:docMkLst>
       <pc:sldChg chg="modSp">
-        <pc:chgData name="David Stevens" userId="b6815b1ecc207c78" providerId="LiveId" clId="{92F79DC4-295C-419E-998B-5F1C8597ADC1}" dt="2018-05-17T09:36:09.317" v="1" actId="1076"/>
+        <pc:chgData name="David Stevens" userId="73fe415a-d21a-4898-bfab-0e75d37181d7" providerId="ADAL" clId="{DE14563C-17CB-460C-9B9E-4A97DFD9A9B8}" dt="2018-10-05T13:15:29.814" v="2" actId="207"/>
         <pc:sldMkLst>
           <pc:docMk/>
-          <pc:sldMk cId="1264948328" sldId="260"/>
-        </pc:sldMkLst>
-        <pc:picChg chg="mod">
-          <ac:chgData name="David Stevens" userId="b6815b1ecc207c78" providerId="LiveId" clId="{92F79DC4-295C-419E-998B-5F1C8597ADC1}" dt="2018-05-17T09:36:09.317" v="1" actId="1076"/>
-          <ac:picMkLst>
-            <pc:docMk/>
-            <pc:sldMk cId="1264948328" sldId="260"/>
-            <ac:picMk id="9" creationId="{74D66916-5977-4A02-A7B9-317728A08DB3}"/>
-          </ac:picMkLst>
-        </pc:picChg>
-      </pc:sldChg>
-      <pc:sldChg chg="modSp">
-        <pc:chgData name="David Stevens" userId="b6815b1ecc207c78" providerId="LiveId" clId="{92F79DC4-295C-419E-998B-5F1C8597ADC1}" dt="2018-05-17T09:38:48.310" v="2" actId="1076"/>
-        <pc:sldMkLst>
-          <pc:docMk/>
-          <pc:sldMk cId="2935416838" sldId="320"/>
+          <pc:sldMk cId="4207284262" sldId="323"/>
         </pc:sldMkLst>
         <pc:grpChg chg="mod">
-          <ac:chgData name="David Stevens" userId="b6815b1ecc207c78" providerId="LiveId" clId="{92F79DC4-295C-419E-998B-5F1C8597ADC1}" dt="2018-05-17T09:38:48.310" v="2" actId="1076"/>
+          <ac:chgData name="David Stevens" userId="73fe415a-d21a-4898-bfab-0e75d37181d7" providerId="ADAL" clId="{DE14563C-17CB-460C-9B9E-4A97DFD9A9B8}" dt="2018-10-05T13:15:29.814" v="2" actId="207"/>
           <ac:grpSpMkLst>
             <pc:docMk/>
-            <pc:sldMk cId="2935416838" sldId="320"/>
-            <ac:grpSpMk id="45" creationId="{631ECF51-9BA7-4585-A80C-4CF7AF0FF284}"/>
+            <pc:sldMk cId="4207284262" sldId="323"/>
+            <ac:grpSpMk id="22" creationId="{C186E666-D28B-48C3-974B-F60C53BA3282}"/>
           </ac:grpSpMkLst>
         </pc:grpChg>
-      </pc:sldChg>
-      <pc:sldChg chg="addSp delSp modSp add">
-        <pc:chgData name="David Stevens" userId="b6815b1ecc207c78" providerId="LiveId" clId="{92F79DC4-295C-419E-998B-5F1C8597ADC1}" dt="2018-05-22T14:59:55.546" v="60" actId="108"/>
-        <pc:sldMkLst>
-          <pc:docMk/>
-          <pc:sldMk cId="3131760488" sldId="326"/>
-        </pc:sldMkLst>
-        <pc:spChg chg="mod">
-          <ac:chgData name="David Stevens" userId="b6815b1ecc207c78" providerId="LiveId" clId="{92F79DC4-295C-419E-998B-5F1C8597ADC1}" dt="2018-05-22T14:56:18" v="12" actId="20577"/>
-          <ac:spMkLst>
-            <pc:docMk/>
-            <pc:sldMk cId="3131760488" sldId="326"/>
-            <ac:spMk id="2" creationId="{D4B79463-B876-4540-962D-874E4F8EFC74}"/>
-          </ac:spMkLst>
-        </pc:spChg>
-        <pc:spChg chg="add del">
-          <ac:chgData name="David Stevens" userId="b6815b1ecc207c78" providerId="LiveId" clId="{92F79DC4-295C-419E-998B-5F1C8597ADC1}" dt="2018-05-22T14:59:45.275" v="54" actId="108"/>
-          <ac:spMkLst>
-            <pc:docMk/>
-            <pc:sldMk cId="3131760488" sldId="326"/>
-            <ac:spMk id="5" creationId="{06ED5559-6029-46C8-B642-78EFF76F5EEB}"/>
-          </ac:spMkLst>
-        </pc:spChg>
-        <pc:spChg chg="del">
-          <ac:chgData name="David Stevens" userId="b6815b1ecc207c78" providerId="LiveId" clId="{92F79DC4-295C-419E-998B-5F1C8597ADC1}" dt="2018-05-22T14:56:59.202" v="52" actId="478"/>
-          <ac:spMkLst>
-            <pc:docMk/>
-            <pc:sldMk cId="3131760488" sldId="326"/>
-            <ac:spMk id="29" creationId="{12648762-B3B1-4B14-A6EA-0606C8649845}"/>
-          </ac:spMkLst>
-        </pc:spChg>
-        <pc:spChg chg="mod">
-          <ac:chgData name="David Stevens" userId="b6815b1ecc207c78" providerId="LiveId" clId="{92F79DC4-295C-419E-998B-5F1C8597ADC1}" dt="2018-05-22T14:56:28.867" v="21" actId="20577"/>
-          <ac:spMkLst>
-            <pc:docMk/>
-            <pc:sldMk cId="3131760488" sldId="326"/>
-            <ac:spMk id="30" creationId="{4AC2557D-B9FE-4FE6-9109-8914290121CA}"/>
-          </ac:spMkLst>
-        </pc:spChg>
-        <pc:grpChg chg="del">
-          <ac:chgData name="David Stevens" userId="b6815b1ecc207c78" providerId="LiveId" clId="{92F79DC4-295C-419E-998B-5F1C8597ADC1}" dt="2018-05-22T14:56:59.202" v="52" actId="478"/>
-          <ac:grpSpMkLst>
-            <pc:docMk/>
-            <pc:sldMk cId="3131760488" sldId="326"/>
-            <ac:grpSpMk id="3" creationId="{7CE0A3A5-9D42-475B-B2A1-08245D51F0EA}"/>
-          </ac:grpSpMkLst>
-        </pc:grpChg>
-        <pc:grpChg chg="del">
-          <ac:chgData name="David Stevens" userId="b6815b1ecc207c78" providerId="LiveId" clId="{92F79DC4-295C-419E-998B-5F1C8597ADC1}" dt="2018-05-22T14:56:59.202" v="52" actId="478"/>
-          <ac:grpSpMkLst>
-            <pc:docMk/>
-            <pc:sldMk cId="3131760488" sldId="326"/>
-            <ac:grpSpMk id="4" creationId="{02C690AF-0FF3-46BF-B393-67E1CEFA4768}"/>
-          </ac:grpSpMkLst>
-        </pc:grpChg>
-        <pc:grpChg chg="del">
-          <ac:chgData name="David Stevens" userId="b6815b1ecc207c78" providerId="LiveId" clId="{92F79DC4-295C-419E-998B-5F1C8597ADC1}" dt="2018-05-22T14:56:59.202" v="52" actId="478"/>
-          <ac:grpSpMkLst>
-            <pc:docMk/>
-            <pc:sldMk cId="3131760488" sldId="326"/>
-            <ac:grpSpMk id="25" creationId="{DF99DE16-4AC6-4F50-81E9-03E885DB9C24}"/>
-          </ac:grpSpMkLst>
-        </pc:grpChg>
-        <pc:graphicFrameChg chg="mod modGraphic">
-          <ac:chgData name="David Stevens" userId="b6815b1ecc207c78" providerId="LiveId" clId="{92F79DC4-295C-419E-998B-5F1C8597ADC1}" dt="2018-05-22T14:59:55.546" v="60" actId="108"/>
-          <ac:graphicFrameMkLst>
-            <pc:docMk/>
-            <pc:sldMk cId="3131760488" sldId="326"/>
-            <ac:graphicFrameMk id="14" creationId="{A7BC4D54-A17B-438E-A39A-7FA0A53C2E78}"/>
-          </ac:graphicFrameMkLst>
-        </pc:graphicFrameChg>
       </pc:sldChg>
     </pc:docChg>
   </pc:docChgLst>
@@ -585,28 +502,6 @@
           </ac:picMkLst>
         </pc:picChg>
       </pc:sldChg>
-      <pc:sldChg chg="delSp">
-        <pc:chgData name="Stevens, David" userId="73fe415a-d21a-4898-bfab-0e75d37181d7" providerId="ADAL" clId="{0D06C720-9C57-4E1E-B275-78274B6009E5}" dt="2018-07-02T09:39:31.602" v="0" actId="478"/>
-        <pc:sldMkLst>
-          <pc:docMk/>
-          <pc:sldMk cId="1816925610" sldId="324"/>
-        </pc:sldMkLst>
-        <pc:grpChg chg="del">
-          <ac:chgData name="Stevens, David" userId="73fe415a-d21a-4898-bfab-0e75d37181d7" providerId="ADAL" clId="{0D06C720-9C57-4E1E-B275-78274B6009E5}" dt="2018-07-02T09:39:31.602" v="0" actId="478"/>
-          <ac:grpSpMkLst>
-            <pc:docMk/>
-            <pc:sldMk cId="1816925610" sldId="324"/>
-            <ac:grpSpMk id="4" creationId="{F6B3966D-4B1C-4AA6-9FFF-1339EB8DE467}"/>
-          </ac:grpSpMkLst>
-        </pc:grpChg>
-      </pc:sldChg>
-      <pc:sldChg chg="del">
-        <pc:chgData name="Stevens, David" userId="73fe415a-d21a-4898-bfab-0e75d37181d7" providerId="ADAL" clId="{0D06C720-9C57-4E1E-B275-78274B6009E5}" dt="2018-07-09T08:13:35.223" v="105" actId="2696"/>
-        <pc:sldMkLst>
-          <pc:docMk/>
-          <pc:sldMk cId="3892881487" sldId="325"/>
-        </pc:sldMkLst>
-      </pc:sldChg>
       <pc:sldChg chg="addSp modSp">
         <pc:chgData name="Stevens, David" userId="73fe415a-d21a-4898-bfab-0e75d37181d7" providerId="ADAL" clId="{0D06C720-9C57-4E1E-B275-78274B6009E5}" dt="2018-07-09T08:19:21.657" v="190" actId="12789"/>
         <pc:sldMkLst>
@@ -658,27 +553,6 @@
   </pc:docChgLst>
   <pc:docChgLst>
     <pc:chgData name="David Stevens" userId="b6815b1ecc207c78" providerId="LiveId" clId="{456B4E9D-26DD-4E28-9DE1-E3370A981174}"/>
-    <pc:docChg chg="custSel modSld">
-      <pc:chgData name="David Stevens" userId="b6815b1ecc207c78" providerId="LiveId" clId="{456B4E9D-26DD-4E28-9DE1-E3370A981174}" dt="2018-06-12T12:39:30.277" v="40" actId="20577"/>
-      <pc:docMkLst>
-        <pc:docMk/>
-      </pc:docMkLst>
-      <pc:sldChg chg="modSp">
-        <pc:chgData name="David Stevens" userId="b6815b1ecc207c78" providerId="LiveId" clId="{456B4E9D-26DD-4E28-9DE1-E3370A981174}" dt="2018-06-12T12:39:30.277" v="40" actId="20577"/>
-        <pc:sldMkLst>
-          <pc:docMk/>
-          <pc:sldMk cId="3942625781" sldId="261"/>
-        </pc:sldMkLst>
-        <pc:spChg chg="mod">
-          <ac:chgData name="David Stevens" userId="b6815b1ecc207c78" providerId="LiveId" clId="{456B4E9D-26DD-4E28-9DE1-E3370A981174}" dt="2018-06-12T12:39:30.277" v="40" actId="20577"/>
-          <ac:spMkLst>
-            <pc:docMk/>
-            <pc:sldMk cId="3942625781" sldId="261"/>
-            <ac:spMk id="3" creationId="{8F09E122-47FB-49E4-9C1E-38878C6D529D}"/>
-          </ac:spMkLst>
-        </pc:spChg>
-      </pc:sldChg>
-    </pc:docChg>
   </pc:docChgLst>
 </pc:chgInfo>
 </file>
@@ -771,7 +645,7 @@
                 <a:latin typeface="Arial"/>
                 <a:cs typeface="Arial"/>
               </a:rPr>
-              <a:t>7/9/2018</a:t>
+              <a:t>10/5/2018</a:t>
             </a:fld>
             <a:endParaRPr lang="en-US">
               <a:latin typeface="Arial"/>
@@ -956,7 +830,7 @@
             <a:fld id="{73B26A0F-F4D6-9B4F-A87B-D8948CDE3BB4}" type="datetimeFigureOut">
               <a:rPr lang="en-US" smtClean="0"/>
               <a:pPr/>
-              <a:t>7/9/2018</a:t>
+              <a:t>10/5/2018</a:t>
             </a:fld>
             <a:endParaRPr lang="en-US"/>
           </a:p>
@@ -2600,7 +2474,7 @@
                   <a:spcPts val="0"/>
                 </a:spcBef>
               </a:pPr>
-              <a:t>July 9, 2018</a:t>
+              <a:t>October 5, 2018</a:t>
             </a:fld>
             <a:endParaRPr lang="en-US" sz="1400" b="0" dirty="0">
               <a:solidFill>
@@ -4403,7 +4277,7 @@
                   <a:spcPct val="50000"/>
                 </a:spcBef>
               </a:pPr>
-              <a:t>July 9, 2018</a:t>
+              <a:t>October 5, 2018</a:t>
             </a:fld>
             <a:endParaRPr lang="en-US" sz="1100" b="0" dirty="0">
               <a:solidFill>
@@ -6156,7 +6030,7 @@
                   <a:spcPct val="50000"/>
                 </a:spcBef>
               </a:pPr>
-              <a:t>July 9, 2018</a:t>
+              <a:t>October 5, 2018</a:t>
             </a:fld>
             <a:endParaRPr lang="en-US" sz="1100" b="0" dirty="0">
               <a:solidFill>
@@ -7627,7 +7501,7 @@
                   <a:spcPct val="50000"/>
                 </a:spcBef>
               </a:pPr>
-              <a:t>July 9, 2018</a:t>
+              <a:t>October 5, 2018</a:t>
             </a:fld>
             <a:endParaRPr lang="en-US" sz="1100" b="0" dirty="0">
               <a:solidFill>
@@ -8980,7 +8854,7 @@
                   <a:spcPts val="0"/>
                 </a:spcBef>
               </a:pPr>
-              <a:t>July 9, 2018</a:t>
+              <a:t>October 5, 2018</a:t>
             </a:fld>
             <a:endParaRPr lang="en-US" sz="1100" b="0" dirty="0">
               <a:solidFill>
@@ -10417,7 +10291,7 @@
                   <a:spcPct val="50000"/>
                 </a:spcBef>
               </a:pPr>
-              <a:t>July 9, 2018</a:t>
+              <a:t>October 5, 2018</a:t>
             </a:fld>
             <a:endParaRPr lang="en-US" sz="1100" b="0" dirty="0">
               <a:solidFill>
@@ -13318,7 +13192,7 @@
                   <a:spcPts val="0"/>
                 </a:spcBef>
               </a:pPr>
-              <a:t>July 9, 2018</a:t>
+              <a:t>October 5, 2018</a:t>
             </a:fld>
             <a:endParaRPr lang="en-US" sz="1400" b="0" dirty="0">
               <a:solidFill>
@@ -14709,7 +14583,7 @@
                   <a:spcPts val="0"/>
                 </a:spcBef>
               </a:pPr>
-              <a:t>July 9, 2018</a:t>
+              <a:t>October 5, 2018</a:t>
             </a:fld>
             <a:endParaRPr lang="en-US" sz="1400" b="0" dirty="0">
               <a:solidFill>
@@ -16270,7 +16144,7 @@
                   <a:spcPts val="0"/>
                 </a:spcBef>
               </a:pPr>
-              <a:t>July 9, 2018</a:t>
+              <a:t>October 5, 2018</a:t>
             </a:fld>
             <a:endParaRPr lang="en-US" sz="1400" b="0" dirty="0">
               <a:solidFill>
@@ -17692,7 +17566,7 @@
                   <a:spcPts val="0"/>
                 </a:spcBef>
               </a:pPr>
-              <a:t>July 9, 2018</a:t>
+              <a:t>October 5, 2018</a:t>
             </a:fld>
             <a:endParaRPr lang="en-US" sz="1400" b="0" dirty="0">
               <a:solidFill>
@@ -19106,7 +18980,7 @@
                   <a:spcPts val="0"/>
                 </a:spcBef>
               </a:pPr>
-              <a:t>July 9, 2018</a:t>
+              <a:t>October 5, 2018</a:t>
             </a:fld>
             <a:endParaRPr lang="en-US" sz="1400" b="0" dirty="0">
               <a:solidFill>
@@ -20854,7 +20728,7 @@
                   <a:spcPts val="0"/>
                 </a:spcBef>
               </a:pPr>
-              <a:t>July 9, 2018</a:t>
+              <a:t>October 5, 2018</a:t>
             </a:fld>
             <a:endParaRPr lang="en-US" sz="1100" b="0" dirty="0">
               <a:solidFill>
@@ -24111,6 +23985,9 @@
             <a:chOff x="2914197" y="4330823"/>
             <a:chExt cx="1662107" cy="1927667"/>
           </a:xfrm>
+          <a:solidFill>
+            <a:srgbClr val="FFED00"/>
+          </a:solidFill>
         </p:grpSpPr>
         <p:sp>
           <p:nvSpPr>
@@ -24134,9 +24011,7 @@
                 <a:gd name="adj" fmla="val 14707"/>
               </a:avLst>
             </a:prstGeom>
-            <a:solidFill>
-              <a:schemeClr val="accent3"/>
-            </a:solidFill>
+            <a:grpFill/>
             <a:ln w="127000" cmpd="thinThick">
               <a:solidFill>
                 <a:schemeClr val="tx1"/>
@@ -24191,7 +24066,7 @@
             <a:prstGeom prst="rect">
               <a:avLst/>
             </a:prstGeom>
-            <a:noFill/>
+            <a:grpFill/>
           </p:spPr>
           <p:txBody>
             <a:bodyPr wrap="square" rtlCol="0">
@@ -24292,6 +24167,7 @@
                 </a:path>
               </a:pathLst>
             </a:custGeom>
+            <a:grpFill/>
           </p:spPr>
         </p:pic>
       </p:grpSp>

</xml_diff>